<commit_message>
did in college (so little)
</commit_message>
<xml_diff>
--- a/OuterData/presentation.pptx
+++ b/OuterData/presentation.pptx
@@ -142,6 +142,9 @@
         </p14:section>
       </p14:sectionLst>
     </p:ext>
+    <p:ext uri="{EFAFB233-063F-42B5-8137-9DF3F51BA10A}">
+      <p15:sldGuideLst xmlns:p15="http://schemas.microsoft.com/office/powerpoint/2012/main"/>
+    </p:ext>
   </p:extLst>
 </p:presentation>
 </file>
@@ -293,7 +296,7 @@
           <a:p>
             <a:fld id="{2260AE4E-DD20-4E50-AF30-C2F3B359971E}" type="datetimeFigureOut">
               <a:rPr lang="ru-RU" smtClean="0"/>
-              <a:t>10.10.2024</a:t>
+              <a:t>22.10.2024</a:t>
             </a:fld>
             <a:endParaRPr lang="ru-RU"/>
           </a:p>
@@ -491,7 +494,7 @@
           <a:p>
             <a:fld id="{2260AE4E-DD20-4E50-AF30-C2F3B359971E}" type="datetimeFigureOut">
               <a:rPr lang="ru-RU" smtClean="0"/>
-              <a:t>10.10.2024</a:t>
+              <a:t>22.10.2024</a:t>
             </a:fld>
             <a:endParaRPr lang="ru-RU"/>
           </a:p>
@@ -699,7 +702,7 @@
           <a:p>
             <a:fld id="{2260AE4E-DD20-4E50-AF30-C2F3B359971E}" type="datetimeFigureOut">
               <a:rPr lang="ru-RU" smtClean="0"/>
-              <a:t>10.10.2024</a:t>
+              <a:t>22.10.2024</a:t>
             </a:fld>
             <a:endParaRPr lang="ru-RU"/>
           </a:p>
@@ -897,7 +900,7 @@
           <a:p>
             <a:fld id="{2260AE4E-DD20-4E50-AF30-C2F3B359971E}" type="datetimeFigureOut">
               <a:rPr lang="ru-RU" smtClean="0"/>
-              <a:t>10.10.2024</a:t>
+              <a:t>22.10.2024</a:t>
             </a:fld>
             <a:endParaRPr lang="ru-RU"/>
           </a:p>
@@ -1172,7 +1175,7 @@
           <a:p>
             <a:fld id="{2260AE4E-DD20-4E50-AF30-C2F3B359971E}" type="datetimeFigureOut">
               <a:rPr lang="ru-RU" smtClean="0"/>
-              <a:t>10.10.2024</a:t>
+              <a:t>22.10.2024</a:t>
             </a:fld>
             <a:endParaRPr lang="ru-RU"/>
           </a:p>
@@ -1437,7 +1440,7 @@
           <a:p>
             <a:fld id="{2260AE4E-DD20-4E50-AF30-C2F3B359971E}" type="datetimeFigureOut">
               <a:rPr lang="ru-RU" smtClean="0"/>
-              <a:t>10.10.2024</a:t>
+              <a:t>22.10.2024</a:t>
             </a:fld>
             <a:endParaRPr lang="ru-RU"/>
           </a:p>
@@ -1849,7 +1852,7 @@
           <a:p>
             <a:fld id="{2260AE4E-DD20-4E50-AF30-C2F3B359971E}" type="datetimeFigureOut">
               <a:rPr lang="ru-RU" smtClean="0"/>
-              <a:t>10.10.2024</a:t>
+              <a:t>22.10.2024</a:t>
             </a:fld>
             <a:endParaRPr lang="ru-RU"/>
           </a:p>
@@ -1990,7 +1993,7 @@
           <a:p>
             <a:fld id="{2260AE4E-DD20-4E50-AF30-C2F3B359971E}" type="datetimeFigureOut">
               <a:rPr lang="ru-RU" smtClean="0"/>
-              <a:t>10.10.2024</a:t>
+              <a:t>22.10.2024</a:t>
             </a:fld>
             <a:endParaRPr lang="ru-RU"/>
           </a:p>
@@ -2103,7 +2106,7 @@
           <a:p>
             <a:fld id="{2260AE4E-DD20-4E50-AF30-C2F3B359971E}" type="datetimeFigureOut">
               <a:rPr lang="ru-RU" smtClean="0"/>
-              <a:t>10.10.2024</a:t>
+              <a:t>22.10.2024</a:t>
             </a:fld>
             <a:endParaRPr lang="ru-RU"/>
           </a:p>
@@ -2414,7 +2417,7 @@
           <a:p>
             <a:fld id="{2260AE4E-DD20-4E50-AF30-C2F3B359971E}" type="datetimeFigureOut">
               <a:rPr lang="ru-RU" smtClean="0"/>
-              <a:t>10.10.2024</a:t>
+              <a:t>22.10.2024</a:t>
             </a:fld>
             <a:endParaRPr lang="ru-RU"/>
           </a:p>
@@ -2702,7 +2705,7 @@
           <a:p>
             <a:fld id="{2260AE4E-DD20-4E50-AF30-C2F3B359971E}" type="datetimeFigureOut">
               <a:rPr lang="ru-RU" smtClean="0"/>
-              <a:t>10.10.2024</a:t>
+              <a:t>22.10.2024</a:t>
             </a:fld>
             <a:endParaRPr lang="ru-RU"/>
           </a:p>
@@ -2943,7 +2946,7 @@
           <a:p>
             <a:fld id="{2260AE4E-DD20-4E50-AF30-C2F3B359971E}" type="datetimeFigureOut">
               <a:rPr lang="ru-RU" smtClean="0"/>
-              <a:t>10.10.2024</a:t>
+              <a:t>22.10.2024</a:t>
             </a:fld>
             <a:endParaRPr lang="ru-RU"/>
           </a:p>
@@ -4408,36 +4411,6 @@
           </a:graphicData>
         </a:graphic>
       </p:graphicFrame>
-      <p:pic>
-        <p:nvPicPr>
-          <p:cNvPr id="5" name="Рисунок 4">
-            <a:extLst>
-              <a:ext uri="{FF2B5EF4-FFF2-40B4-BE49-F238E27FC236}">
-                <a16:creationId xmlns:a16="http://schemas.microsoft.com/office/drawing/2014/main" id="{CB694249-F0B9-2F4C-AD17-653A80B20925}"/>
-              </a:ext>
-            </a:extLst>
-          </p:cNvPr>
-          <p:cNvPicPr>
-            <a:picLocks noChangeAspect="1"/>
-          </p:cNvPicPr>
-          <p:nvPr/>
-        </p:nvPicPr>
-        <p:blipFill>
-          <a:blip r:embed="rId2"/>
-          <a:stretch>
-            <a:fillRect/>
-          </a:stretch>
-        </p:blipFill>
-        <p:spPr>
-          <a:xfrm>
-            <a:off x="4327557" y="3560969"/>
-            <a:ext cx="3218241" cy="3206496"/>
-          </a:xfrm>
-          <a:prstGeom prst="rect">
-            <a:avLst/>
-          </a:prstGeom>
-        </p:spPr>
-      </p:pic>
     </p:spTree>
     <p:extLst>
       <p:ext uri="{BB962C8B-B14F-4D97-AF65-F5344CB8AC3E}">

</xml_diff>